<commit_message>
Added Training Results and Visualization
</commit_message>
<xml_diff>
--- a/RL_Boat_Presentation.pptx
+++ b/RL_Boat_Presentation.pptx
@@ -10,7 +10,8 @@
     <p:sldId id="257" r:id="rId4"/>
     <p:sldId id="261" r:id="rId5"/>
     <p:sldId id="260" r:id="rId6"/>
-    <p:sldId id="258" r:id="rId7"/>
+    <p:sldId id="262" r:id="rId7"/>
+    <p:sldId id="258" r:id="rId8"/>
   </p:sldIdLst>
   <p:sldSz cx="12192000" cy="6858000"/>
   <p:notesSz cx="6858000" cy="9144000"/>
@@ -3800,168 +3801,6 @@
       </p:sp>
       <p:sp>
         <p:nvSpPr>
-          <p:cNvPr id="10" name="Pfeil: nach unten 9">
-            <a:extLst>
-              <a:ext uri="{FF2B5EF4-FFF2-40B4-BE49-F238E27FC236}">
-                <a16:creationId xmlns:a16="http://schemas.microsoft.com/office/drawing/2014/main" id="{C2C9EB74-FB2C-67BF-0D66-F4A4DEE6686F}"/>
-              </a:ext>
-            </a:extLst>
-          </p:cNvPr>
-          <p:cNvSpPr/>
-          <p:nvPr/>
-        </p:nvSpPr>
-        <p:spPr>
-          <a:xfrm>
-            <a:off x="2323731" y="4847555"/>
-            <a:ext cx="330397" cy="1226674"/>
-          </a:xfrm>
-          <a:prstGeom prst="downArrow">
-            <a:avLst/>
-          </a:prstGeom>
-          <a:solidFill>
-            <a:srgbClr val="FF0000"/>
-          </a:solidFill>
-          <a:ln>
-            <a:solidFill>
-              <a:srgbClr val="FF0000"/>
-            </a:solidFill>
-          </a:ln>
-        </p:spPr>
-        <p:style>
-          <a:lnRef idx="2">
-            <a:schemeClr val="accent1">
-              <a:shade val="15000"/>
-            </a:schemeClr>
-          </a:lnRef>
-          <a:fillRef idx="1">
-            <a:schemeClr val="accent1"/>
-          </a:fillRef>
-          <a:effectRef idx="0">
-            <a:schemeClr val="accent1"/>
-          </a:effectRef>
-          <a:fontRef idx="minor">
-            <a:schemeClr val="lt1"/>
-          </a:fontRef>
-        </p:style>
-        <p:txBody>
-          <a:bodyPr rtlCol="0" anchor="ctr"/>
-          <a:lstStyle/>
-          <a:p>
-            <a:pPr algn="ctr"/>
-            <a:endParaRPr lang="en-US" noProof="0" dirty="0"/>
-          </a:p>
-        </p:txBody>
-      </p:sp>
-      <p:sp>
-        <p:nvSpPr>
-          <p:cNvPr id="11" name="Pfeil: nach unten 10">
-            <a:extLst>
-              <a:ext uri="{FF2B5EF4-FFF2-40B4-BE49-F238E27FC236}">
-                <a16:creationId xmlns:a16="http://schemas.microsoft.com/office/drawing/2014/main" id="{7C45D82E-4CA0-2851-F1DA-68FB79D14E2E}"/>
-              </a:ext>
-            </a:extLst>
-          </p:cNvPr>
-          <p:cNvSpPr/>
-          <p:nvPr/>
-        </p:nvSpPr>
-        <p:spPr>
-          <a:xfrm>
-            <a:off x="7131126" y="4847555"/>
-            <a:ext cx="330397" cy="1226674"/>
-          </a:xfrm>
-          <a:prstGeom prst="downArrow">
-            <a:avLst/>
-          </a:prstGeom>
-          <a:solidFill>
-            <a:srgbClr val="FF0000"/>
-          </a:solidFill>
-          <a:ln>
-            <a:solidFill>
-              <a:srgbClr val="FF0000"/>
-            </a:solidFill>
-          </a:ln>
-        </p:spPr>
-        <p:style>
-          <a:lnRef idx="2">
-            <a:schemeClr val="accent1">
-              <a:shade val="15000"/>
-            </a:schemeClr>
-          </a:lnRef>
-          <a:fillRef idx="1">
-            <a:schemeClr val="accent1"/>
-          </a:fillRef>
-          <a:effectRef idx="0">
-            <a:schemeClr val="accent1"/>
-          </a:effectRef>
-          <a:fontRef idx="minor">
-            <a:schemeClr val="lt1"/>
-          </a:fontRef>
-        </p:style>
-        <p:txBody>
-          <a:bodyPr rtlCol="0" anchor="ctr"/>
-          <a:lstStyle/>
-          <a:p>
-            <a:pPr algn="ctr"/>
-            <a:endParaRPr lang="en-US" noProof="0" dirty="0"/>
-          </a:p>
-        </p:txBody>
-      </p:sp>
-      <p:sp>
-        <p:nvSpPr>
-          <p:cNvPr id="12" name="Ellipse 11">
-            <a:extLst>
-              <a:ext uri="{FF2B5EF4-FFF2-40B4-BE49-F238E27FC236}">
-                <a16:creationId xmlns:a16="http://schemas.microsoft.com/office/drawing/2014/main" id="{09B8BC87-7D07-12D3-925B-800CE7AFBBCD}"/>
-              </a:ext>
-            </a:extLst>
-          </p:cNvPr>
-          <p:cNvSpPr/>
-          <p:nvPr/>
-        </p:nvSpPr>
-        <p:spPr>
-          <a:xfrm>
-            <a:off x="4776330" y="3980535"/>
-            <a:ext cx="232593" cy="231569"/>
-          </a:xfrm>
-          <a:prstGeom prst="ellipse">
-            <a:avLst/>
-          </a:prstGeom>
-          <a:solidFill>
-            <a:srgbClr val="FF0000"/>
-          </a:solidFill>
-          <a:ln>
-            <a:solidFill>
-              <a:srgbClr val="FF0000"/>
-            </a:solidFill>
-          </a:ln>
-        </p:spPr>
-        <p:style>
-          <a:lnRef idx="2">
-            <a:schemeClr val="accent1">
-              <a:shade val="15000"/>
-            </a:schemeClr>
-          </a:lnRef>
-          <a:fillRef idx="1">
-            <a:schemeClr val="accent1"/>
-          </a:fillRef>
-          <a:effectRef idx="0">
-            <a:schemeClr val="accent1"/>
-          </a:effectRef>
-          <a:fontRef idx="minor">
-            <a:schemeClr val="lt1"/>
-          </a:fontRef>
-        </p:style>
-        <p:txBody>
-          <a:bodyPr rtlCol="0" anchor="ctr"/>
-          <a:lstStyle/>
-          <a:p>
-            <a:pPr algn="ctr"/>
-            <a:endParaRPr lang="en-US" noProof="0" dirty="0"/>
-          </a:p>
-        </p:txBody>
-      </p:sp>
-      <p:sp>
-        <p:nvSpPr>
           <p:cNvPr id="18" name="Bogen 17">
             <a:extLst>
               <a:ext uri="{FF2B5EF4-FFF2-40B4-BE49-F238E27FC236}">
@@ -4634,10 +4473,10 @@
       </p:sp>
       <p:sp>
         <p:nvSpPr>
-          <p:cNvPr id="10" name="Pfeil: nach unten 9">
-            <a:extLst>
-              <a:ext uri="{FF2B5EF4-FFF2-40B4-BE49-F238E27FC236}">
-                <a16:creationId xmlns:a16="http://schemas.microsoft.com/office/drawing/2014/main" id="{4F55DC2B-8545-786F-1658-4AE7737297F0}"/>
+          <p:cNvPr id="12" name="Ellipse 11">
+            <a:extLst>
+              <a:ext uri="{FF2B5EF4-FFF2-40B4-BE49-F238E27FC236}">
+                <a16:creationId xmlns:a16="http://schemas.microsoft.com/office/drawing/2014/main" id="{C447AF3E-395A-BF8B-7475-1C1E5BC91A2D}"/>
               </a:ext>
             </a:extLst>
           </p:cNvPr>
@@ -4646,10 +4485,10 @@
         </p:nvSpPr>
         <p:spPr>
           <a:xfrm>
-            <a:off x="2323731" y="4847555"/>
-            <a:ext cx="330397" cy="1226674"/>
-          </a:xfrm>
-          <a:prstGeom prst="downArrow">
+            <a:off x="4776330" y="3980535"/>
+            <a:ext cx="232593" cy="231569"/>
+          </a:xfrm>
+          <a:prstGeom prst="ellipse">
             <a:avLst/>
           </a:prstGeom>
           <a:solidFill>
@@ -4688,10 +4527,146 @@
       </p:sp>
       <p:sp>
         <p:nvSpPr>
-          <p:cNvPr id="11" name="Pfeil: nach unten 10">
-            <a:extLst>
-              <a:ext uri="{FF2B5EF4-FFF2-40B4-BE49-F238E27FC236}">
-                <a16:creationId xmlns:a16="http://schemas.microsoft.com/office/drawing/2014/main" id="{99C1C43A-490F-0165-E7C0-19D089B39F4C}"/>
+          <p:cNvPr id="20" name="Textfeld 19">
+            <a:extLst>
+              <a:ext uri="{FF2B5EF4-FFF2-40B4-BE49-F238E27FC236}">
+                <a16:creationId xmlns:a16="http://schemas.microsoft.com/office/drawing/2014/main" id="{A808CD5C-CCF5-BE66-F6AF-37E3C9932436}"/>
+              </a:ext>
+            </a:extLst>
+          </p:cNvPr>
+          <p:cNvSpPr txBox="1"/>
+          <p:nvPr/>
+        </p:nvSpPr>
+        <p:spPr>
+          <a:xfrm>
+            <a:off x="8180710" y="1270660"/>
+            <a:ext cx="3894138" cy="4524315"/>
+          </a:xfrm>
+          <a:prstGeom prst="rect">
+            <a:avLst/>
+          </a:prstGeom>
+          <a:noFill/>
+        </p:spPr>
+        <p:txBody>
+          <a:bodyPr wrap="square" rtlCol="0">
+            <a:spAutoFit/>
+          </a:bodyPr>
+          <a:lstStyle/>
+          <a:p>
+            <a:r>
+              <a:rPr lang="en-US" noProof="0" dirty="0"/>
+              <a:t>Continuous State Space, 6D:</a:t>
+            </a:r>
+          </a:p>
+          <a:p>
+            <a:endParaRPr lang="en-US" noProof="0" dirty="0"/>
+          </a:p>
+          <a:p>
+            <a:r>
+              <a:rPr lang="en-US" dirty="0"/>
+              <a:t>Position:</a:t>
+            </a:r>
+          </a:p>
+          <a:p>
+            <a:pPr marL="285750" indent="-285750">
+              <a:buFontTx/>
+              <a:buChar char="-"/>
+            </a:pPr>
+            <a:r>
+              <a:rPr lang="en-US" dirty="0"/>
+              <a:t>X</a:t>
+            </a:r>
+          </a:p>
+          <a:p>
+            <a:pPr marL="285750" indent="-285750">
+              <a:buFontTx/>
+              <a:buChar char="-"/>
+            </a:pPr>
+            <a:r>
+              <a:rPr lang="en-US" dirty="0"/>
+              <a:t>Y</a:t>
+            </a:r>
+          </a:p>
+          <a:p>
+            <a:pPr marL="285750" indent="-285750">
+              <a:buFontTx/>
+              <a:buChar char="-"/>
+            </a:pPr>
+            <a:r>
+              <a:rPr lang="en-US" dirty="0"/>
+              <a:t>Theta</a:t>
+            </a:r>
+          </a:p>
+          <a:p>
+            <a:pPr marL="285750" indent="-285750">
+              <a:buFontTx/>
+              <a:buChar char="-"/>
+            </a:pPr>
+            <a:endParaRPr lang="en-US" dirty="0"/>
+          </a:p>
+          <a:p>
+            <a:r>
+              <a:rPr lang="en-US" dirty="0"/>
+              <a:t>Velocities:</a:t>
+            </a:r>
+          </a:p>
+          <a:p>
+            <a:pPr marL="285750" indent="-285750">
+              <a:buFontTx/>
+              <a:buChar char="-"/>
+            </a:pPr>
+            <a:r>
+              <a:rPr lang="en-US" dirty="0"/>
+              <a:t>V_X</a:t>
+            </a:r>
+          </a:p>
+          <a:p>
+            <a:pPr marL="285750" indent="-285750">
+              <a:buFontTx/>
+              <a:buChar char="-"/>
+            </a:pPr>
+            <a:r>
+              <a:rPr lang="en-US" dirty="0"/>
+              <a:t>V_Y</a:t>
+            </a:r>
+          </a:p>
+          <a:p>
+            <a:pPr marL="285750" indent="-285750">
+              <a:buFontTx/>
+              <a:buChar char="-"/>
+            </a:pPr>
+            <a:r>
+              <a:rPr lang="en-US" dirty="0"/>
+              <a:t>Omega</a:t>
+            </a:r>
+          </a:p>
+          <a:p>
+            <a:pPr marL="285750" indent="-285750">
+              <a:buFontTx/>
+              <a:buChar char="-"/>
+            </a:pPr>
+            <a:endParaRPr lang="en-US" dirty="0"/>
+          </a:p>
+          <a:p>
+            <a:endParaRPr lang="en-US" dirty="0"/>
+          </a:p>
+          <a:p>
+            <a:endParaRPr lang="en-US" dirty="0"/>
+          </a:p>
+          <a:p>
+            <a:endParaRPr lang="en-US" noProof="0" dirty="0"/>
+          </a:p>
+          <a:p>
+            <a:endParaRPr lang="en-US" noProof="0" dirty="0"/>
+          </a:p>
+        </p:txBody>
+      </p:sp>
+      <p:sp>
+        <p:nvSpPr>
+          <p:cNvPr id="14" name="Pfeil: nach unten 13">
+            <a:extLst>
+              <a:ext uri="{FF2B5EF4-FFF2-40B4-BE49-F238E27FC236}">
+                <a16:creationId xmlns:a16="http://schemas.microsoft.com/office/drawing/2014/main" id="{55BE2608-FD81-E266-550B-2949336962FA}"/>
               </a:ext>
             </a:extLst>
           </p:cNvPr>
@@ -4699,8 +4674,8 @@
           <p:nvPr/>
         </p:nvSpPr>
         <p:spPr>
-          <a:xfrm>
-            <a:off x="7131126" y="4847555"/>
+          <a:xfrm rot="10800000">
+            <a:off x="4727427" y="1261086"/>
             <a:ext cx="330397" cy="1226674"/>
           </a:xfrm>
           <a:prstGeom prst="downArrow">
@@ -4742,10 +4717,10 @@
       </p:sp>
       <p:sp>
         <p:nvSpPr>
-          <p:cNvPr id="12" name="Ellipse 11">
-            <a:extLst>
-              <a:ext uri="{FF2B5EF4-FFF2-40B4-BE49-F238E27FC236}">
-                <a16:creationId xmlns:a16="http://schemas.microsoft.com/office/drawing/2014/main" id="{C447AF3E-395A-BF8B-7475-1C1E5BC91A2D}"/>
+          <p:cNvPr id="16" name="Pfeil: nach unten 15">
+            <a:extLst>
+              <a:ext uri="{FF2B5EF4-FFF2-40B4-BE49-F238E27FC236}">
+                <a16:creationId xmlns:a16="http://schemas.microsoft.com/office/drawing/2014/main" id="{A5273E7B-6161-EF96-7EE7-79FF9AE3B3CF}"/>
               </a:ext>
             </a:extLst>
           </p:cNvPr>
@@ -4753,11 +4728,11 @@
           <p:nvPr/>
         </p:nvSpPr>
         <p:spPr>
-          <a:xfrm>
-            <a:off x="4776330" y="3980535"/>
-            <a:ext cx="232593" cy="231569"/>
-          </a:xfrm>
-          <a:prstGeom prst="ellipse">
+          <a:xfrm rot="16200000">
+            <a:off x="5449657" y="3482982"/>
+            <a:ext cx="187036" cy="1226674"/>
+          </a:xfrm>
+          <a:prstGeom prst="downArrow">
             <a:avLst/>
           </a:prstGeom>
           <a:solidFill>
@@ -4796,10 +4771,10 @@
       </p:sp>
       <p:sp>
         <p:nvSpPr>
-          <p:cNvPr id="18" name="Bogen 17">
-            <a:extLst>
-              <a:ext uri="{FF2B5EF4-FFF2-40B4-BE49-F238E27FC236}">
-                <a16:creationId xmlns:a16="http://schemas.microsoft.com/office/drawing/2014/main" id="{FC69B6B1-2912-5867-4321-11FF0CBC84BB}"/>
+          <p:cNvPr id="17" name="Pfeil: nach unten 16">
+            <a:extLst>
+              <a:ext uri="{FF2B5EF4-FFF2-40B4-BE49-F238E27FC236}">
+                <a16:creationId xmlns:a16="http://schemas.microsoft.com/office/drawing/2014/main" id="{99893A67-7471-05D1-952D-507A69BFF430}"/>
               </a:ext>
             </a:extLst>
           </p:cNvPr>
@@ -4807,38 +4782,36 @@
           <p:nvPr/>
         </p:nvSpPr>
         <p:spPr>
-          <a:xfrm flipH="1">
-            <a:off x="2371269" y="3082731"/>
-            <a:ext cx="1965708" cy="1746372"/>
-          </a:xfrm>
-          <a:prstGeom prst="arc">
-            <a:avLst>
-              <a:gd name="adj1" fmla="val 16455465"/>
-              <a:gd name="adj2" fmla="val 0"/>
-            </a:avLst>
+          <a:xfrm rot="10800000">
+            <a:off x="4796213" y="2908724"/>
+            <a:ext cx="192823" cy="1226674"/>
+          </a:xfrm>
+          <a:prstGeom prst="downArrow">
+            <a:avLst/>
           </a:prstGeom>
-          <a:ln w="9525" cap="flat" cmpd="sng" algn="ctr">
+          <a:solidFill>
+            <a:srgbClr val="FF0000"/>
+          </a:solidFill>
+          <a:ln>
             <a:solidFill>
-              <a:schemeClr val="accent1"/>
+              <a:srgbClr val="FF0000"/>
             </a:solidFill>
-            <a:prstDash val="solid"/>
-            <a:round/>
-            <a:headEnd type="none" w="med" len="med"/>
-            <a:tailEnd type="arrow" w="med" len="med"/>
           </a:ln>
         </p:spPr>
         <p:style>
-          <a:lnRef idx="0">
-            <a:scrgbClr r="0" g="0" b="0"/>
+          <a:lnRef idx="2">
+            <a:schemeClr val="accent1">
+              <a:shade val="15000"/>
+            </a:schemeClr>
           </a:lnRef>
-          <a:fillRef idx="0">
-            <a:scrgbClr r="0" g="0" b="0"/>
+          <a:fillRef idx="1">
+            <a:schemeClr val="accent1"/>
           </a:fillRef>
           <a:effectRef idx="0">
-            <a:scrgbClr r="0" g="0" b="0"/>
+            <a:schemeClr val="accent1"/>
           </a:effectRef>
           <a:fontRef idx="minor">
-            <a:schemeClr val="tx1"/>
+            <a:schemeClr val="lt1"/>
           </a:fontRef>
         </p:style>
         <p:txBody>
@@ -4846,207 +4819,6 @@
           <a:lstStyle/>
           <a:p>
             <a:pPr algn="ctr"/>
-            <a:endParaRPr lang="en-US" noProof="0" dirty="0"/>
-          </a:p>
-        </p:txBody>
-      </p:sp>
-      <p:sp>
-        <p:nvSpPr>
-          <p:cNvPr id="19" name="Bogen 18">
-            <a:extLst>
-              <a:ext uri="{FF2B5EF4-FFF2-40B4-BE49-F238E27FC236}">
-                <a16:creationId xmlns:a16="http://schemas.microsoft.com/office/drawing/2014/main" id="{6A66C6DB-F3CB-7FCD-0025-40A38C91EC61}"/>
-              </a:ext>
-            </a:extLst>
-          </p:cNvPr>
-          <p:cNvSpPr/>
-          <p:nvPr/>
-        </p:nvSpPr>
-        <p:spPr>
-          <a:xfrm>
-            <a:off x="5219026" y="3085744"/>
-            <a:ext cx="1965708" cy="1746372"/>
-          </a:xfrm>
-          <a:prstGeom prst="arc">
-            <a:avLst>
-              <a:gd name="adj1" fmla="val 16455465"/>
-              <a:gd name="adj2" fmla="val 0"/>
-            </a:avLst>
-          </a:prstGeom>
-          <a:ln w="9525" cap="flat" cmpd="sng" algn="ctr">
-            <a:solidFill>
-              <a:schemeClr val="accent1"/>
-            </a:solidFill>
-            <a:prstDash val="solid"/>
-            <a:round/>
-            <a:headEnd type="none" w="med" len="med"/>
-            <a:tailEnd type="arrow" w="med" len="med"/>
-          </a:ln>
-        </p:spPr>
-        <p:style>
-          <a:lnRef idx="0">
-            <a:scrgbClr r="0" g="0" b="0"/>
-          </a:lnRef>
-          <a:fillRef idx="0">
-            <a:scrgbClr r="0" g="0" b="0"/>
-          </a:fillRef>
-          <a:effectRef idx="0">
-            <a:scrgbClr r="0" g="0" b="0"/>
-          </a:effectRef>
-          <a:fontRef idx="minor">
-            <a:schemeClr val="tx1"/>
-          </a:fontRef>
-        </p:style>
-        <p:txBody>
-          <a:bodyPr rtlCol="0" anchor="ctr"/>
-          <a:lstStyle/>
-          <a:p>
-            <a:pPr algn="ctr"/>
-            <a:endParaRPr lang="en-US" noProof="0" dirty="0"/>
-          </a:p>
-        </p:txBody>
-      </p:sp>
-      <p:sp>
-        <p:nvSpPr>
-          <p:cNvPr id="20" name="Textfeld 19">
-            <a:extLst>
-              <a:ext uri="{FF2B5EF4-FFF2-40B4-BE49-F238E27FC236}">
-                <a16:creationId xmlns:a16="http://schemas.microsoft.com/office/drawing/2014/main" id="{A808CD5C-CCF5-BE66-F6AF-37E3C9932436}"/>
-              </a:ext>
-            </a:extLst>
-          </p:cNvPr>
-          <p:cNvSpPr txBox="1"/>
-          <p:nvPr/>
-        </p:nvSpPr>
-        <p:spPr>
-          <a:xfrm>
-            <a:off x="8180710" y="1270660"/>
-            <a:ext cx="3894138" cy="4524315"/>
-          </a:xfrm>
-          <a:prstGeom prst="rect">
-            <a:avLst/>
-          </a:prstGeom>
-          <a:noFill/>
-        </p:spPr>
-        <p:txBody>
-          <a:bodyPr wrap="square" rtlCol="0">
-            <a:spAutoFit/>
-          </a:bodyPr>
-          <a:lstStyle/>
-          <a:p>
-            <a:r>
-              <a:rPr lang="en-US" noProof="0" dirty="0"/>
-              <a:t>Continuous State Space, 6D:</a:t>
-            </a:r>
-          </a:p>
-          <a:p>
-            <a:endParaRPr lang="en-US" noProof="0" dirty="0"/>
-          </a:p>
-          <a:p>
-            <a:r>
-              <a:rPr lang="en-US" dirty="0"/>
-              <a:t>Position:</a:t>
-            </a:r>
-          </a:p>
-          <a:p>
-            <a:pPr marL="285750" indent="-285750">
-              <a:buFontTx/>
-              <a:buChar char="-"/>
-            </a:pPr>
-            <a:r>
-              <a:rPr lang="en-US" dirty="0"/>
-              <a:t>X</a:t>
-            </a:r>
-          </a:p>
-          <a:p>
-            <a:pPr marL="285750" indent="-285750">
-              <a:buFontTx/>
-              <a:buChar char="-"/>
-            </a:pPr>
-            <a:r>
-              <a:rPr lang="en-US" dirty="0"/>
-              <a:t>Y</a:t>
-            </a:r>
-          </a:p>
-          <a:p>
-            <a:pPr marL="285750" indent="-285750">
-              <a:buFontTx/>
-              <a:buChar char="-"/>
-            </a:pPr>
-            <a:r>
-              <a:rPr lang="en-US" dirty="0"/>
-              <a:t>Theta</a:t>
-            </a:r>
-          </a:p>
-          <a:p>
-            <a:r>
-              <a:rPr lang="en-US" dirty="0" err="1"/>
-              <a:t>Velocitiy</a:t>
-            </a:r>
-            <a:r>
-              <a:rPr lang="en-US" dirty="0"/>
-              <a:t>:</a:t>
-            </a:r>
-          </a:p>
-          <a:p>
-            <a:pPr marL="285750" indent="-285750">
-              <a:buFontTx/>
-              <a:buChar char="-"/>
-            </a:pPr>
-            <a:r>
-              <a:rPr lang="en-US" dirty="0"/>
-              <a:t>V_X</a:t>
-            </a:r>
-          </a:p>
-          <a:p>
-            <a:pPr marL="285750" indent="-285750">
-              <a:buFontTx/>
-              <a:buChar char="-"/>
-            </a:pPr>
-            <a:r>
-              <a:rPr lang="en-US" dirty="0"/>
-              <a:t>V_Y</a:t>
-            </a:r>
-          </a:p>
-          <a:p>
-            <a:pPr marL="285750" indent="-285750">
-              <a:buFontTx/>
-              <a:buChar char="-"/>
-            </a:pPr>
-            <a:r>
-              <a:rPr lang="en-US" dirty="0"/>
-              <a:t>omega</a:t>
-            </a:r>
-          </a:p>
-          <a:p>
-            <a:pPr marL="285750" indent="-285750">
-              <a:buFontTx/>
-              <a:buChar char="-"/>
-            </a:pPr>
-            <a:endParaRPr lang="en-US" dirty="0"/>
-          </a:p>
-          <a:p>
-            <a:pPr marL="285750" indent="-285750">
-              <a:buFont typeface="Wingdings" panose="05000000000000000000" pitchFamily="2" charset="2"/>
-              <a:buChar char="à"/>
-            </a:pPr>
-            <a:r>
-              <a:rPr lang="en-US" dirty="0">
-                <a:sym typeface="Wingdings" panose="05000000000000000000" pitchFamily="2" charset="2"/>
-              </a:rPr>
-              <a:t>In total 3² = 9 Actions</a:t>
-            </a:r>
-          </a:p>
-          <a:p>
-            <a:endParaRPr lang="en-US" dirty="0"/>
-          </a:p>
-          <a:p>
-            <a:endParaRPr lang="en-US" dirty="0"/>
-          </a:p>
-          <a:p>
-            <a:endParaRPr lang="en-US" noProof="0" dirty="0"/>
-          </a:p>
-          <a:p>
             <a:endParaRPr lang="en-US" noProof="0" dirty="0"/>
           </a:p>
         </p:txBody>
@@ -5894,11 +5666,135 @@
           <a:chExt cx="0" cy="0"/>
         </a:xfrm>
       </p:grpSpPr>
+      <p:pic>
+        <p:nvPicPr>
+          <p:cNvPr id="5" name="Grafik 4">
+            <a:extLst>
+              <a:ext uri="{FF2B5EF4-FFF2-40B4-BE49-F238E27FC236}">
+                <a16:creationId xmlns:a16="http://schemas.microsoft.com/office/drawing/2014/main" id="{8725DFFA-073F-442A-480A-536E141E2C6F}"/>
+              </a:ext>
+            </a:extLst>
+          </p:cNvPr>
+          <p:cNvPicPr>
+            <a:picLocks noChangeAspect="1"/>
+          </p:cNvPicPr>
+          <p:nvPr/>
+        </p:nvPicPr>
+        <p:blipFill>
+          <a:blip r:embed="rId2"/>
+          <a:stretch>
+            <a:fillRect/>
+          </a:stretch>
+        </p:blipFill>
+        <p:spPr>
+          <a:xfrm>
+            <a:off x="4495800" y="0"/>
+            <a:ext cx="6858000" cy="6858000"/>
+          </a:xfrm>
+          <a:prstGeom prst="rect">
+            <a:avLst/>
+          </a:prstGeom>
+        </p:spPr>
+      </p:pic>
       <p:sp>
         <p:nvSpPr>
           <p:cNvPr id="2" name="Titel 1">
             <a:extLst>
               <a:ext uri="{FF2B5EF4-FFF2-40B4-BE49-F238E27FC236}">
+                <a16:creationId xmlns:a16="http://schemas.microsoft.com/office/drawing/2014/main" id="{CE43FDDE-04FC-C3D2-A5BF-C697CF40C7DA}"/>
+              </a:ext>
+            </a:extLst>
+          </p:cNvPr>
+          <p:cNvSpPr>
+            <a:spLocks noGrp="1"/>
+          </p:cNvSpPr>
+          <p:nvPr>
+            <p:ph type="title"/>
+          </p:nvPr>
+        </p:nvSpPr>
+        <p:spPr/>
+        <p:txBody>
+          <a:bodyPr/>
+          <a:lstStyle/>
+          <a:p>
+            <a:r>
+              <a:rPr lang="de-DE" dirty="0"/>
+              <a:t>The Task</a:t>
+            </a:r>
+          </a:p>
+        </p:txBody>
+      </p:sp>
+      <p:pic>
+        <p:nvPicPr>
+          <p:cNvPr id="7" name="Grafik 6">
+            <a:extLst>
+              <a:ext uri="{FF2B5EF4-FFF2-40B4-BE49-F238E27FC236}">
+                <a16:creationId xmlns:a16="http://schemas.microsoft.com/office/drawing/2014/main" id="{A3C9BFBC-A521-AF79-FC08-E8990ECFAEE7}"/>
+              </a:ext>
+            </a:extLst>
+          </p:cNvPr>
+          <p:cNvPicPr>
+            <a:picLocks noChangeAspect="1"/>
+          </p:cNvPicPr>
+          <p:nvPr/>
+        </p:nvPicPr>
+        <p:blipFill>
+          <a:blip r:embed="rId3">
+            <a:extLst>
+              <a:ext uri="{28A0092B-C50C-407E-A947-70E740481C1C}">
+                <a14:useLocalDpi xmlns:a14="http://schemas.microsoft.com/office/drawing/2010/main" val="0"/>
+              </a:ext>
+            </a:extLst>
+          </a:blip>
+          <a:stretch>
+            <a:fillRect/>
+          </a:stretch>
+        </p:blipFill>
+        <p:spPr>
+          <a:xfrm>
+            <a:off x="256398" y="2055813"/>
+            <a:ext cx="4000907" cy="2850646"/>
+          </a:xfrm>
+          <a:prstGeom prst="rect">
+            <a:avLst/>
+          </a:prstGeom>
+        </p:spPr>
+      </p:pic>
+    </p:spTree>
+    <p:extLst>
+      <p:ext uri="{BB962C8B-B14F-4D97-AF65-F5344CB8AC3E}">
+        <p14:creationId xmlns:p14="http://schemas.microsoft.com/office/powerpoint/2010/main" val="3238875332"/>
+      </p:ext>
+    </p:extLst>
+  </p:cSld>
+  <p:clrMapOvr>
+    <a:masterClrMapping/>
+  </p:clrMapOvr>
+</p:sld>
+</file>
+
+<file path=ppt/slides/slide7.xml><?xml version="1.0" encoding="utf-8"?>
+<p:sld xmlns:a="http://schemas.openxmlformats.org/drawingml/2006/main" xmlns:r="http://schemas.openxmlformats.org/officeDocument/2006/relationships" xmlns:p="http://schemas.openxmlformats.org/presentationml/2006/main">
+  <p:cSld>
+    <p:spTree>
+      <p:nvGrpSpPr>
+        <p:cNvPr id="1" name=""/>
+        <p:cNvGrpSpPr/>
+        <p:nvPr/>
+      </p:nvGrpSpPr>
+      <p:grpSpPr>
+        <a:xfrm>
+          <a:off x="0" y="0"/>
+          <a:ext cx="0" cy="0"/>
+          <a:chOff x="0" y="0"/>
+          <a:chExt cx="0" cy="0"/>
+        </a:xfrm>
+      </p:grpSpPr>
+      <p:sp>
+        <p:nvSpPr>
+          <p:cNvPr id="2" name="Titel 1">
+            <a:extLst>
+              <a:ext uri="{FF2B5EF4-FFF2-40B4-BE49-F238E27FC236}">
                 <a16:creationId xmlns:a16="http://schemas.microsoft.com/office/drawing/2014/main" id="{C8D07229-7B1A-B8C1-F007-468E1F91D0A0}"/>
               </a:ext>
             </a:extLst>
@@ -5915,32 +5811,151 @@
           <a:bodyPr/>
           <a:lstStyle/>
           <a:p>
-            <a:endParaRPr lang="en-US" noProof="0" dirty="0"/>
-          </a:p>
-        </p:txBody>
-      </p:sp>
-      <p:sp>
-        <p:nvSpPr>
-          <p:cNvPr id="3" name="Inhaltsplatzhalter 2">
-            <a:extLst>
-              <a:ext uri="{FF2B5EF4-FFF2-40B4-BE49-F238E27FC236}">
-                <a16:creationId xmlns:a16="http://schemas.microsoft.com/office/drawing/2014/main" id="{510FF6C7-0ECA-1747-A2A1-CDB53ABFFB78}"/>
-              </a:ext>
-            </a:extLst>
-          </p:cNvPr>
-          <p:cNvSpPr>
-            <a:spLocks noGrp="1"/>
-          </p:cNvSpPr>
-          <p:nvPr>
-            <p:ph idx="1"/>
-          </p:nvPr>
-        </p:nvSpPr>
-        <p:spPr/>
-        <p:txBody>
-          <a:bodyPr/>
-          <a:lstStyle/>
-          <a:p>
-            <a:endParaRPr lang="en-US" noProof="0" dirty="0"/>
+            <a:r>
+              <a:rPr lang="en-US" noProof="0" dirty="0"/>
+              <a:t>The Algorithm</a:t>
+            </a:r>
+          </a:p>
+        </p:txBody>
+      </p:sp>
+      <p:sp>
+        <p:nvSpPr>
+          <p:cNvPr id="6" name="AutoShape 2">
+            <a:extLst>
+              <a:ext uri="{FF2B5EF4-FFF2-40B4-BE49-F238E27FC236}">
+                <a16:creationId xmlns:a16="http://schemas.microsoft.com/office/drawing/2014/main" id="{6C2240C7-5D62-A71D-E766-E14741F3D5AB}"/>
+              </a:ext>
+            </a:extLst>
+          </p:cNvPr>
+          <p:cNvSpPr>
+            <a:spLocks noChangeAspect="1" noChangeArrowheads="1"/>
+          </p:cNvSpPr>
+          <p:nvPr/>
+        </p:nvSpPr>
+        <p:spPr bwMode="auto">
+          <a:xfrm>
+            <a:off x="5943599" y="3276599"/>
+            <a:ext cx="1561605" cy="1561605"/>
+          </a:xfrm>
+          <a:prstGeom prst="rect">
+            <a:avLst/>
+          </a:prstGeom>
+          <a:noFill/>
+          <a:extLst>
+            <a:ext uri="{909E8E84-426E-40DD-AFC4-6F175D3DCCD1}">
+              <a14:hiddenFill xmlns:a14="http://schemas.microsoft.com/office/drawing/2010/main">
+                <a:solidFill>
+                  <a:srgbClr val="FFFFFF"/>
+                </a:solidFill>
+              </a14:hiddenFill>
+            </a:ext>
+          </a:extLst>
+        </p:spPr>
+        <p:txBody>
+          <a:bodyPr vert="horz" wrap="square" lIns="91440" tIns="45720" rIns="91440" bIns="45720" numCol="1" anchor="t" anchorCtr="0" compatLnSpc="1">
+            <a:prstTxWarp prst="textNoShape">
+              <a:avLst/>
+            </a:prstTxWarp>
+          </a:bodyPr>
+          <a:lstStyle/>
+          <a:p>
+            <a:endParaRPr lang="de-DE"/>
+          </a:p>
+        </p:txBody>
+      </p:sp>
+      <p:pic>
+        <p:nvPicPr>
+          <p:cNvPr id="8" name="Grafik 7">
+            <a:extLst>
+              <a:ext uri="{FF2B5EF4-FFF2-40B4-BE49-F238E27FC236}">
+                <a16:creationId xmlns:a16="http://schemas.microsoft.com/office/drawing/2014/main" id="{995D2482-6439-1362-7F0A-DE795EE42E27}"/>
+              </a:ext>
+            </a:extLst>
+          </p:cNvPr>
+          <p:cNvPicPr>
+            <a:picLocks noChangeAspect="1"/>
+          </p:cNvPicPr>
+          <p:nvPr/>
+        </p:nvPicPr>
+        <p:blipFill>
+          <a:blip r:embed="rId2">
+            <a:extLst>
+              <a:ext uri="{28A0092B-C50C-407E-A947-70E740481C1C}">
+                <a14:useLocalDpi xmlns:a14="http://schemas.microsoft.com/office/drawing/2010/main" val="0"/>
+              </a:ext>
+            </a:extLst>
+          </a:blip>
+          <a:stretch>
+            <a:fillRect/>
+          </a:stretch>
+        </p:blipFill>
+        <p:spPr>
+          <a:xfrm>
+            <a:off x="1828800" y="1506620"/>
+            <a:ext cx="7897091" cy="4822161"/>
+          </a:xfrm>
+          <a:prstGeom prst="rect">
+            <a:avLst/>
+          </a:prstGeom>
+        </p:spPr>
+      </p:pic>
+      <p:sp>
+        <p:nvSpPr>
+          <p:cNvPr id="9" name="Rahmen 8">
+            <a:extLst>
+              <a:ext uri="{FF2B5EF4-FFF2-40B4-BE49-F238E27FC236}">
+                <a16:creationId xmlns:a16="http://schemas.microsoft.com/office/drawing/2014/main" id="{51234A4F-3572-BB70-7812-1207628349C0}"/>
+              </a:ext>
+            </a:extLst>
+          </p:cNvPr>
+          <p:cNvSpPr/>
+          <p:nvPr/>
+        </p:nvSpPr>
+        <p:spPr>
+          <a:xfrm>
+            <a:off x="5296395" y="3222605"/>
+            <a:ext cx="4304805" cy="1765032"/>
+          </a:xfrm>
+          <a:prstGeom prst="frame">
+            <a:avLst>
+              <a:gd name="adj1" fmla="val 2763"/>
+            </a:avLst>
+          </a:prstGeom>
+          <a:solidFill>
+            <a:srgbClr val="FF0000"/>
+          </a:solidFill>
+          <a:ln>
+            <a:solidFill>
+              <a:srgbClr val="FF0000"/>
+            </a:solidFill>
+          </a:ln>
+        </p:spPr>
+        <p:style>
+          <a:lnRef idx="2">
+            <a:schemeClr val="accent1">
+              <a:shade val="15000"/>
+            </a:schemeClr>
+          </a:lnRef>
+          <a:fillRef idx="1">
+            <a:schemeClr val="accent1"/>
+          </a:fillRef>
+          <a:effectRef idx="0">
+            <a:schemeClr val="accent1"/>
+          </a:effectRef>
+          <a:fontRef idx="minor">
+            <a:schemeClr val="lt1"/>
+          </a:fontRef>
+        </p:style>
+        <p:txBody>
+          <a:bodyPr rtlCol="0" anchor="ctr"/>
+          <a:lstStyle/>
+          <a:p>
+            <a:pPr algn="ctr"/>
+            <a:endParaRPr lang="de-DE">
+              <a:solidFill>
+                <a:schemeClr val="tx1"/>
+              </a:solidFill>
+            </a:endParaRPr>
           </a:p>
         </p:txBody>
       </p:sp>

</xml_diff>